<commit_message>
Update Présentation chat UE Web.pptx
Update to the presentation
</commit_message>
<xml_diff>
--- a/Présentation chat UE Web.pptx
+++ b/Présentation chat UE Web.pptx
@@ -17,6 +17,7 @@
     <p:sldId id="261" r:id="rId12"/>
     <p:sldId id="262" r:id="rId13"/>
     <p:sldId id="263" r:id="rId14"/>
+    <p:sldId id="264" r:id="rId15"/>
   </p:sldIdLst>
   <p:sldSz cy="5143500" cx="9144000"/>
   <p:notesSz cx="6858000" cy="9144000"/>
@@ -812,7 +813,7 @@
       </p:grpSpPr>
       <p:sp>
         <p:nvSpPr>
-          <p:cNvPr id="139" name="Google Shape;139;g11e8d33ece3_1_484:notes"/>
+          <p:cNvPr id="139" name="Google Shape;139;g11a7cc0049d_0_71:notes"/>
           <p:cNvSpPr txBox="1"/>
           <p:nvPr>
             <p:ph idx="1" type="body"/>
@@ -851,7 +852,7 @@
       </p:sp>
       <p:sp>
         <p:nvSpPr>
-          <p:cNvPr id="140" name="Google Shape;140;g11e8d33ece3_1_484:notes"/>
+          <p:cNvPr id="140" name="Google Shape;140;g11a7cc0049d_0_71:notes"/>
           <p:cNvSpPr/>
           <p:nvPr>
             <p:ph idx="2" type="sldImg"/>
@@ -897,7 +898,7 @@
   <p:cSld>
     <p:spTree>
       <p:nvGrpSpPr>
-        <p:cNvPr id="150" name="Shape 150"/>
+        <p:cNvPr id="151" name="Shape 151"/>
         <p:cNvGrpSpPr/>
         <p:nvPr/>
       </p:nvGrpSpPr>
@@ -911,7 +912,7 @@
       </p:grpSpPr>
       <p:sp>
         <p:nvSpPr>
-          <p:cNvPr id="151" name="Google Shape;151;g11e8d33ece3_1_595:notes"/>
+          <p:cNvPr id="152" name="Google Shape;152;g11e8d33ece3_1_484:notes"/>
           <p:cNvSpPr txBox="1"/>
           <p:nvPr>
             <p:ph idx="1" type="body"/>
@@ -950,7 +951,7 @@
       </p:sp>
       <p:sp>
         <p:nvSpPr>
-          <p:cNvPr id="152" name="Google Shape;152;g11e8d33ece3_1_595:notes"/>
+          <p:cNvPr id="153" name="Google Shape;153;g11e8d33ece3_1_484:notes"/>
           <p:cNvSpPr/>
           <p:nvPr>
             <p:ph idx="2" type="sldImg"/>
@@ -996,7 +997,7 @@
   <p:cSld>
     <p:spTree>
       <p:nvGrpSpPr>
-        <p:cNvPr id="160" name="Shape 160"/>
+        <p:cNvPr id="163" name="Shape 163"/>
         <p:cNvGrpSpPr/>
         <p:nvPr/>
       </p:nvGrpSpPr>
@@ -1010,7 +1011,7 @@
       </p:grpSpPr>
       <p:sp>
         <p:nvSpPr>
-          <p:cNvPr id="161" name="Google Shape;161;g11e8d33ece3_1_293:notes"/>
+          <p:cNvPr id="164" name="Google Shape;164;g11e8d33ece3_1_595:notes"/>
           <p:cNvSpPr txBox="1"/>
           <p:nvPr>
             <p:ph idx="1" type="body"/>
@@ -1049,7 +1050,7 @@
       </p:sp>
       <p:sp>
         <p:nvSpPr>
-          <p:cNvPr id="162" name="Google Shape;162;g11e8d33ece3_1_293:notes"/>
+          <p:cNvPr id="165" name="Google Shape;165;g11e8d33ece3_1_595:notes"/>
           <p:cNvSpPr/>
           <p:nvPr>
             <p:ph idx="2" type="sldImg"/>
@@ -1095,7 +1096,7 @@
   <p:cSld>
     <p:spTree>
       <p:nvGrpSpPr>
-        <p:cNvPr id="167" name="Shape 167"/>
+        <p:cNvPr id="173" name="Shape 173"/>
         <p:cNvGrpSpPr/>
         <p:nvPr/>
       </p:nvGrpSpPr>
@@ -1109,7 +1110,7 @@
       </p:grpSpPr>
       <p:sp>
         <p:nvSpPr>
-          <p:cNvPr id="168" name="Google Shape;168;g11e8d33ece3_1_578:notes"/>
+          <p:cNvPr id="174" name="Google Shape;174;g11e8d33ece3_1_293:notes"/>
           <p:cNvSpPr txBox="1"/>
           <p:nvPr>
             <p:ph idx="1" type="body"/>
@@ -1148,7 +1149,7 @@
       </p:sp>
       <p:sp>
         <p:nvSpPr>
-          <p:cNvPr id="169" name="Google Shape;169;g11e8d33ece3_1_578:notes"/>
+          <p:cNvPr id="175" name="Google Shape;175;g11e8d33ece3_1_293:notes"/>
           <p:cNvSpPr/>
           <p:nvPr>
             <p:ph idx="2" type="sldImg"/>
@@ -1194,7 +1195,7 @@
   <p:cSld>
     <p:spTree>
       <p:nvGrpSpPr>
-        <p:cNvPr id="174" name="Shape 174"/>
+        <p:cNvPr id="181" name="Shape 181"/>
         <p:cNvGrpSpPr/>
         <p:nvPr/>
       </p:nvGrpSpPr>
@@ -1208,7 +1209,7 @@
       </p:grpSpPr>
       <p:sp>
         <p:nvSpPr>
-          <p:cNvPr id="175" name="Google Shape;175;g11a7cc0049d_0_42:notes"/>
+          <p:cNvPr id="182" name="Google Shape;182;g11e8d33ece3_1_578:notes"/>
           <p:cNvSpPr txBox="1"/>
           <p:nvPr>
             <p:ph idx="1" type="body"/>
@@ -1247,7 +1248,7 @@
       </p:sp>
       <p:sp>
         <p:nvSpPr>
-          <p:cNvPr id="176" name="Google Shape;176;g11a7cc0049d_0_42:notes"/>
+          <p:cNvPr id="183" name="Google Shape;183;g11e8d33ece3_1_578:notes"/>
           <p:cNvSpPr/>
           <p:nvPr>
             <p:ph idx="2" type="sldImg"/>
@@ -1293,7 +1294,7 @@
   <p:cSld>
     <p:spTree>
       <p:nvGrpSpPr>
-        <p:cNvPr id="199" name="Shape 199"/>
+        <p:cNvPr id="188" name="Shape 188"/>
         <p:cNvGrpSpPr/>
         <p:nvPr/>
       </p:nvGrpSpPr>
@@ -1307,7 +1308,106 @@
       </p:grpSpPr>
       <p:sp>
         <p:nvSpPr>
-          <p:cNvPr id="200" name="Google Shape;200;g11a7cc0049d_0_34:notes"/>
+          <p:cNvPr id="189" name="Google Shape;189;g11a7cc0049d_0_42:notes"/>
+          <p:cNvSpPr txBox="1"/>
+          <p:nvPr>
+            <p:ph idx="1" type="body"/>
+          </p:nvPr>
+        </p:nvSpPr>
+        <p:spPr>
+          <a:xfrm>
+            <a:off x="685800" y="4343400"/>
+            <a:ext cx="5486400" cy="4114800"/>
+          </a:xfrm>
+          <a:prstGeom prst="rect">
+            <a:avLst/>
+          </a:prstGeom>
+        </p:spPr>
+        <p:txBody>
+          <a:bodyPr anchorCtr="0" anchor="t" bIns="91425" lIns="91425" spcFirstLastPara="1" rIns="91425" wrap="square" tIns="91425">
+            <a:noAutofit/>
+          </a:bodyPr>
+          <a:lstStyle/>
+          <a:p>
+            <a:pPr indent="0" lvl="0" marL="0" rtl="0" algn="l">
+              <a:spcBef>
+                <a:spcPts val="0"/>
+              </a:spcBef>
+              <a:spcAft>
+                <a:spcPts val="0"/>
+              </a:spcAft>
+              <a:buNone/>
+            </a:pPr>
+            <a:r>
+              <a:t/>
+            </a:r>
+            <a:endParaRPr/>
+          </a:p>
+        </p:txBody>
+      </p:sp>
+      <p:sp>
+        <p:nvSpPr>
+          <p:cNvPr id="190" name="Google Shape;190;g11a7cc0049d_0_42:notes"/>
+          <p:cNvSpPr/>
+          <p:nvPr>
+            <p:ph idx="2" type="sldImg"/>
+          </p:nvPr>
+        </p:nvSpPr>
+        <p:spPr>
+          <a:xfrm>
+            <a:off x="381000" y="685800"/>
+            <a:ext cx="6096000" cy="3429000"/>
+          </a:xfrm>
+          <a:custGeom>
+            <a:rect b="b" l="l" r="r" t="t"/>
+            <a:pathLst>
+              <a:path extrusionOk="0" h="120000" w="120000">
+                <a:moveTo>
+                  <a:pt x="0" y="0"/>
+                </a:moveTo>
+                <a:lnTo>
+                  <a:pt x="120000" y="0"/>
+                </a:lnTo>
+                <a:lnTo>
+                  <a:pt x="120000" y="120000"/>
+                </a:lnTo>
+                <a:lnTo>
+                  <a:pt x="0" y="120000"/>
+                </a:lnTo>
+                <a:close/>
+              </a:path>
+            </a:pathLst>
+          </a:custGeom>
+        </p:spPr>
+      </p:sp>
+    </p:spTree>
+  </p:cSld>
+  <p:clrMapOvr>
+    <a:masterClrMapping/>
+  </p:clrMapOvr>
+</p:notes>
+</file>
+
+<file path=ppt/notesSlides/notesSlide8.xml><?xml version="1.0" encoding="utf-8"?>
+<p:notes xmlns:a="http://schemas.openxmlformats.org/drawingml/2006/main" xmlns:r="http://schemas.openxmlformats.org/officeDocument/2006/relationships" xmlns:mc="http://schemas.openxmlformats.org/markup-compatibility/2006" xmlns:mv="urn:schemas-microsoft-com:mac:vml" xmlns:p="http://schemas.openxmlformats.org/presentationml/2006/main" xmlns:c="http://schemas.openxmlformats.org/drawingml/2006/chart" xmlns:dgm="http://schemas.openxmlformats.org/drawingml/2006/diagram" xmlns:o="urn:schemas-microsoft-com:office:office" xmlns:v="urn:schemas-microsoft-com:vml" xmlns:pvml="urn:schemas-microsoft-com:office:powerpoint" xmlns:com="http://schemas.openxmlformats.org/drawingml/2006/compatibility" xmlns:p14="http://schemas.microsoft.com/office/powerpoint/2010/main" xmlns:p15="http://schemas.microsoft.com/office/powerpoint/2012/main" xmlns:ahyp="http://schemas.microsoft.com/office/drawing/2018/hyperlinkcolor" showMasterPhAnim="0" showMasterSp="0">
+  <p:cSld>
+    <p:spTree>
+      <p:nvGrpSpPr>
+        <p:cNvPr id="215" name="Shape 215"/>
+        <p:cNvGrpSpPr/>
+        <p:nvPr/>
+      </p:nvGrpSpPr>
+      <p:grpSpPr>
+        <a:xfrm>
+          <a:off x="0" y="0"/>
+          <a:ext cx="0" cy="0"/>
+          <a:chOff x="0" y="0"/>
+          <a:chExt cx="0" cy="0"/>
+        </a:xfrm>
+      </p:grpSpPr>
+      <p:sp>
+        <p:nvSpPr>
+          <p:cNvPr id="216" name="Google Shape;216;g11a7cc0049d_0_34:notes"/>
           <p:cNvSpPr/>
           <p:nvPr>
             <p:ph idx="2" type="sldImg"/>
@@ -1342,7 +1442,7 @@
       </p:sp>
       <p:sp>
         <p:nvSpPr>
-          <p:cNvPr id="201" name="Google Shape;201;g11a7cc0049d_0_34:notes"/>
+          <p:cNvPr id="217" name="Google Shape;217;g11a7cc0049d_0_34:notes"/>
           <p:cNvSpPr txBox="1"/>
           <p:nvPr>
             <p:ph idx="1" type="body"/>
@@ -1387,12 +1487,12 @@
 </p:notes>
 </file>
 
-<file path=ppt/notesSlides/notesSlide8.xml><?xml version="1.0" encoding="utf-8"?>
+<file path=ppt/notesSlides/notesSlide9.xml><?xml version="1.0" encoding="utf-8"?>
 <p:notes xmlns:a="http://schemas.openxmlformats.org/drawingml/2006/main" xmlns:r="http://schemas.openxmlformats.org/officeDocument/2006/relationships" xmlns:mc="http://schemas.openxmlformats.org/markup-compatibility/2006" xmlns:mv="urn:schemas-microsoft-com:mac:vml" xmlns:p="http://schemas.openxmlformats.org/presentationml/2006/main" xmlns:c="http://schemas.openxmlformats.org/drawingml/2006/chart" xmlns:dgm="http://schemas.openxmlformats.org/drawingml/2006/diagram" xmlns:o="urn:schemas-microsoft-com:office:office" xmlns:v="urn:schemas-microsoft-com:vml" xmlns:pvml="urn:schemas-microsoft-com:office:powerpoint" xmlns:com="http://schemas.openxmlformats.org/drawingml/2006/compatibility" xmlns:p14="http://schemas.microsoft.com/office/powerpoint/2010/main" xmlns:p15="http://schemas.microsoft.com/office/powerpoint/2012/main" xmlns:ahyp="http://schemas.microsoft.com/office/drawing/2018/hyperlinkcolor" showMasterPhAnim="0" showMasterSp="0">
   <p:cSld>
     <p:spTree>
       <p:nvGrpSpPr>
-        <p:cNvPr id="204" name="Shape 204"/>
+        <p:cNvPr id="220" name="Shape 220"/>
         <p:cNvGrpSpPr/>
         <p:nvPr/>
       </p:nvGrpSpPr>
@@ -1406,7 +1506,7 @@
       </p:grpSpPr>
       <p:sp>
         <p:nvSpPr>
-          <p:cNvPr id="205" name="Google Shape;205;g11a7cc0049d_0_38:notes"/>
+          <p:cNvPr id="221" name="Google Shape;221;g11a7cc0049d_0_38:notes"/>
           <p:cNvSpPr/>
           <p:nvPr>
             <p:ph idx="2" type="sldImg"/>
@@ -1441,7 +1541,7 @@
       </p:sp>
       <p:sp>
         <p:nvSpPr>
-          <p:cNvPr id="206" name="Google Shape;206;g11a7cc0049d_0_38:notes"/>
+          <p:cNvPr id="222" name="Google Shape;222;g11a7cc0049d_0_38:notes"/>
           <p:cNvSpPr txBox="1"/>
           <p:nvPr>
             <p:ph idx="1" type="body"/>
@@ -15836,8 +15936,8 @@
         </p:nvSpPr>
         <p:spPr>
           <a:xfrm>
-            <a:off x="3363350" y="38875"/>
-            <a:ext cx="5668200" cy="3360000"/>
+            <a:off x="5099050" y="983150"/>
+            <a:ext cx="3699300" cy="3360000"/>
           </a:xfrm>
           <a:prstGeom prst="rect">
             <a:avLst/>
@@ -15895,6 +15995,29 @@
               <a:buNone/>
             </a:pPr>
             <a:r>
+              <a:t/>
+            </a:r>
+            <a:endParaRPr/>
+          </a:p>
+          <a:p>
+            <a:pPr indent="0" lvl="1" marL="0" rtl="0" algn="r">
+              <a:lnSpc>
+                <a:spcPct val="100000"/>
+              </a:lnSpc>
+              <a:spcBef>
+                <a:spcPts val="0"/>
+              </a:spcBef>
+              <a:spcAft>
+                <a:spcPts val="0"/>
+              </a:spcAft>
+              <a:buClr>
+                <a:schemeClr val="lt1"/>
+              </a:buClr>
+              <a:buSzPts val="850"/>
+              <a:buFont typeface="Arial"/>
+              <a:buNone/>
+            </a:pPr>
+            <a:r>
               <a:rPr lang="fr"/>
               <a:t>OurWhats</a:t>
             </a:r>
@@ -15912,8 +16035,8 @@
         </p:nvSpPr>
         <p:spPr>
           <a:xfrm>
-            <a:off x="-4165850" y="3677050"/>
-            <a:ext cx="8485200" cy="1931700"/>
+            <a:off x="88875" y="4476950"/>
+            <a:ext cx="4483200" cy="820800"/>
           </a:xfrm>
           <a:prstGeom prst="rect">
             <a:avLst/>
@@ -15929,30 +16052,7 @@
           </a:bodyPr>
           <a:lstStyle/>
           <a:p>
-            <a:pPr indent="0" lvl="0" marL="0" rtl="0" algn="r">
-              <a:lnSpc>
-                <a:spcPct val="100000"/>
-              </a:lnSpc>
-              <a:spcBef>
-                <a:spcPts val="0"/>
-              </a:spcBef>
-              <a:spcAft>
-                <a:spcPts val="0"/>
-              </a:spcAft>
-              <a:buClr>
-                <a:schemeClr val="lt1"/>
-              </a:buClr>
-              <a:buSzPts val="850"/>
-              <a:buFont typeface="Arial"/>
-              <a:buNone/>
-            </a:pPr>
-            <a:r>
-              <a:t/>
-            </a:r>
-            <a:endParaRPr/>
-          </a:p>
-          <a:p>
-            <a:pPr indent="0" lvl="1" marL="0" rtl="0" algn="r">
+            <a:pPr indent="0" lvl="1" marL="0" rtl="0" algn="l">
               <a:lnSpc>
                 <a:spcPct val="100000"/>
               </a:lnSpc>
@@ -16098,9 +16198,356 @@
           </a:p>
         </p:txBody>
       </p:sp>
+      <p:sp>
+        <p:nvSpPr>
+          <p:cNvPr id="144" name="Google Shape;144;p24"/>
+          <p:cNvSpPr txBox="1"/>
+          <p:nvPr>
+            <p:ph type="title"/>
+          </p:nvPr>
+        </p:nvSpPr>
+        <p:spPr>
+          <a:xfrm>
+            <a:off x="3193525" y="1362075"/>
+            <a:ext cx="2560800" cy="450000"/>
+          </a:xfrm>
+          <a:prstGeom prst="rect">
+            <a:avLst/>
+          </a:prstGeom>
+          <a:noFill/>
+          <a:ln cap="flat" cmpd="sng" w="19050">
+            <a:solidFill>
+              <a:srgbClr val="FF0000"/>
+            </a:solidFill>
+            <a:prstDash val="solid"/>
+            <a:round/>
+            <a:headEnd len="sm" w="sm" type="none"/>
+            <a:tailEnd len="sm" w="sm" type="none"/>
+          </a:ln>
+        </p:spPr>
+        <p:txBody>
+          <a:bodyPr anchorCtr="0" anchor="b" bIns="0" lIns="0" spcFirstLastPara="1" rIns="0" wrap="square" tIns="0">
+            <a:noAutofit/>
+          </a:bodyPr>
+          <a:lstStyle/>
+          <a:p>
+            <a:pPr indent="0" lvl="0" marL="0" rtl="0" algn="ctr">
+              <a:lnSpc>
+                <a:spcPct val="100000"/>
+              </a:lnSpc>
+              <a:spcBef>
+                <a:spcPts val="0"/>
+              </a:spcBef>
+              <a:spcAft>
+                <a:spcPts val="0"/>
+              </a:spcAft>
+              <a:buClr>
+                <a:schemeClr val="lt2"/>
+              </a:buClr>
+              <a:buSzPts val="2200"/>
+              <a:buFont typeface="Arial"/>
+              <a:buNone/>
+            </a:pPr>
+            <a:r>
+              <a:rPr i="1" lang="fr" sz="3000"/>
+              <a:t>Inspirations</a:t>
+            </a:r>
+            <a:endParaRPr i="1" sz="3000"/>
+          </a:p>
+        </p:txBody>
+      </p:sp>
       <p:pic>
         <p:nvPicPr>
-          <p:cNvPr id="144" name="Google Shape;144;p24"/>
+          <p:cNvPr id="145" name="Google Shape;145;p24"/>
+          <p:cNvPicPr preferRelativeResize="0"/>
+          <p:nvPr/>
+        </p:nvPicPr>
+        <p:blipFill>
+          <a:blip r:embed="rId3">
+            <a:alphaModFix/>
+          </a:blip>
+          <a:stretch>
+            <a:fillRect/>
+          </a:stretch>
+        </p:blipFill>
+        <p:spPr>
+          <a:xfrm>
+            <a:off x="1900839" y="2724150"/>
+            <a:ext cx="4222128" cy="2419350"/>
+          </a:xfrm>
+          <a:prstGeom prst="rect">
+            <a:avLst/>
+          </a:prstGeom>
+          <a:noFill/>
+          <a:ln>
+            <a:noFill/>
+          </a:ln>
+        </p:spPr>
+      </p:pic>
+      <p:pic>
+        <p:nvPicPr>
+          <p:cNvPr id="146" name="Google Shape;146;p24"/>
+          <p:cNvPicPr preferRelativeResize="0"/>
+          <p:nvPr/>
+        </p:nvPicPr>
+        <p:blipFill>
+          <a:blip r:embed="rId4">
+            <a:alphaModFix/>
+          </a:blip>
+          <a:stretch>
+            <a:fillRect/>
+          </a:stretch>
+        </p:blipFill>
+        <p:spPr>
+          <a:xfrm>
+            <a:off x="5989954" y="1276950"/>
+            <a:ext cx="2923870" cy="1856744"/>
+          </a:xfrm>
+          <a:prstGeom prst="rect">
+            <a:avLst/>
+          </a:prstGeom>
+          <a:noFill/>
+          <a:ln>
+            <a:noFill/>
+          </a:ln>
+        </p:spPr>
+      </p:pic>
+      <p:pic>
+        <p:nvPicPr>
+          <p:cNvPr id="147" name="Google Shape;147;p24"/>
+          <p:cNvPicPr preferRelativeResize="0"/>
+          <p:nvPr/>
+        </p:nvPicPr>
+        <p:blipFill>
+          <a:blip r:embed="rId5">
+            <a:alphaModFix/>
+          </a:blip>
+          <a:stretch>
+            <a:fillRect/>
+          </a:stretch>
+        </p:blipFill>
+        <p:spPr>
+          <a:xfrm>
+            <a:off x="50475" y="860037"/>
+            <a:ext cx="2923876" cy="1646288"/>
+          </a:xfrm>
+          <a:prstGeom prst="rect">
+            <a:avLst/>
+          </a:prstGeom>
+          <a:noFill/>
+          <a:ln>
+            <a:noFill/>
+          </a:ln>
+        </p:spPr>
+      </p:pic>
+      <p:pic>
+        <p:nvPicPr>
+          <p:cNvPr id="148" name="Google Shape;148;p24"/>
+          <p:cNvPicPr preferRelativeResize="0"/>
+          <p:nvPr/>
+        </p:nvPicPr>
+        <p:blipFill>
+          <a:blip r:embed="rId6">
+            <a:alphaModFix/>
+          </a:blip>
+          <a:stretch>
+            <a:fillRect/>
+          </a:stretch>
+        </p:blipFill>
+        <p:spPr>
+          <a:xfrm>
+            <a:off x="229375" y="2646400"/>
+            <a:ext cx="755275" cy="755275"/>
+          </a:xfrm>
+          <a:prstGeom prst="rect">
+            <a:avLst/>
+          </a:prstGeom>
+          <a:noFill/>
+          <a:ln>
+            <a:noFill/>
+          </a:ln>
+        </p:spPr>
+      </p:pic>
+      <p:pic>
+        <p:nvPicPr>
+          <p:cNvPr id="149" name="Google Shape;149;p24"/>
+          <p:cNvPicPr preferRelativeResize="0"/>
+          <p:nvPr/>
+        </p:nvPicPr>
+        <p:blipFill>
+          <a:blip r:embed="rId7">
+            <a:alphaModFix/>
+          </a:blip>
+          <a:stretch>
+            <a:fillRect/>
+          </a:stretch>
+        </p:blipFill>
+        <p:spPr>
+          <a:xfrm>
+            <a:off x="7988800" y="3247852"/>
+            <a:ext cx="925025" cy="929175"/>
+          </a:xfrm>
+          <a:prstGeom prst="rect">
+            <a:avLst/>
+          </a:prstGeom>
+          <a:noFill/>
+          <a:ln>
+            <a:noFill/>
+          </a:ln>
+        </p:spPr>
+      </p:pic>
+      <p:pic>
+        <p:nvPicPr>
+          <p:cNvPr id="150" name="Google Shape;150;p24"/>
+          <p:cNvPicPr preferRelativeResize="0"/>
+          <p:nvPr/>
+        </p:nvPicPr>
+        <p:blipFill>
+          <a:blip r:embed="rId8">
+            <a:alphaModFix/>
+          </a:blip>
+          <a:stretch>
+            <a:fillRect/>
+          </a:stretch>
+        </p:blipFill>
+        <p:spPr>
+          <a:xfrm>
+            <a:off x="5989948" y="4177023"/>
+            <a:ext cx="755275" cy="755275"/>
+          </a:xfrm>
+          <a:prstGeom prst="rect">
+            <a:avLst/>
+          </a:prstGeom>
+          <a:noFill/>
+          <a:ln>
+            <a:noFill/>
+          </a:ln>
+        </p:spPr>
+      </p:pic>
+    </p:spTree>
+  </p:cSld>
+  <p:clrMapOvr>
+    <a:masterClrMapping/>
+  </p:clrMapOvr>
+</p:sld>
+</file>
+
+<file path=ppt/slides/slide3.xml><?xml version="1.0" encoding="utf-8"?>
+<p:sld xmlns:a="http://schemas.openxmlformats.org/drawingml/2006/main" xmlns:r="http://schemas.openxmlformats.org/officeDocument/2006/relationships" xmlns:mc="http://schemas.openxmlformats.org/markup-compatibility/2006" xmlns:mv="urn:schemas-microsoft-com:mac:vml" xmlns:p="http://schemas.openxmlformats.org/presentationml/2006/main" xmlns:c="http://schemas.openxmlformats.org/drawingml/2006/chart" xmlns:dgm="http://schemas.openxmlformats.org/drawingml/2006/diagram" xmlns:o="urn:schemas-microsoft-com:office:office" xmlns:v="urn:schemas-microsoft-com:vml" xmlns:pvml="urn:schemas-microsoft-com:office:powerpoint" xmlns:com="http://schemas.openxmlformats.org/drawingml/2006/compatibility" xmlns:p14="http://schemas.microsoft.com/office/powerpoint/2010/main" xmlns:p15="http://schemas.microsoft.com/office/powerpoint/2012/main" xmlns:ahyp="http://schemas.microsoft.com/office/drawing/2018/hyperlinkcolor">
+  <p:cSld>
+    <p:spTree>
+      <p:nvGrpSpPr>
+        <p:cNvPr id="154" name="Shape 154"/>
+        <p:cNvGrpSpPr/>
+        <p:nvPr/>
+      </p:nvGrpSpPr>
+      <p:grpSpPr>
+        <a:xfrm>
+          <a:off x="0" y="0"/>
+          <a:ext cx="0" cy="0"/>
+          <a:chOff x="0" y="0"/>
+          <a:chExt cx="0" cy="0"/>
+        </a:xfrm>
+      </p:grpSpPr>
+      <p:sp>
+        <p:nvSpPr>
+          <p:cNvPr id="155" name="Google Shape;155;p25"/>
+          <p:cNvSpPr txBox="1"/>
+          <p:nvPr>
+            <p:ph type="title"/>
+          </p:nvPr>
+        </p:nvSpPr>
+        <p:spPr>
+          <a:xfrm>
+            <a:off x="396000" y="0"/>
+            <a:ext cx="7231800" cy="450000"/>
+          </a:xfrm>
+          <a:prstGeom prst="rect">
+            <a:avLst/>
+          </a:prstGeom>
+          <a:noFill/>
+          <a:ln>
+            <a:noFill/>
+          </a:ln>
+        </p:spPr>
+        <p:txBody>
+          <a:bodyPr anchorCtr="0" anchor="b" bIns="0" lIns="0" spcFirstLastPara="1" rIns="0" wrap="square" tIns="0">
+            <a:noAutofit/>
+          </a:bodyPr>
+          <a:lstStyle/>
+          <a:p>
+            <a:pPr indent="0" lvl="0" marL="0" rtl="0" algn="l">
+              <a:lnSpc>
+                <a:spcPct val="100000"/>
+              </a:lnSpc>
+              <a:spcBef>
+                <a:spcPts val="0"/>
+              </a:spcBef>
+              <a:spcAft>
+                <a:spcPts val="0"/>
+              </a:spcAft>
+              <a:buClr>
+                <a:schemeClr val="lt2"/>
+              </a:buClr>
+              <a:buSzPts val="2200"/>
+              <a:buFont typeface="Arial"/>
+              <a:buNone/>
+            </a:pPr>
+            <a:r>
+              <a:rPr lang="fr"/>
+              <a:t>Le livrable : OurWhats</a:t>
+            </a:r>
+            <a:endParaRPr/>
+          </a:p>
+        </p:txBody>
+      </p:sp>
+      <p:sp>
+        <p:nvSpPr>
+          <p:cNvPr id="156" name="Google Shape;156;p25"/>
+          <p:cNvSpPr txBox="1"/>
+          <p:nvPr>
+            <p:ph idx="12" type="sldNum"/>
+          </p:nvPr>
+        </p:nvSpPr>
+        <p:spPr>
+          <a:xfrm>
+            <a:off x="7627938" y="214536"/>
+            <a:ext cx="1127100" cy="303600"/>
+          </a:xfrm>
+          <a:prstGeom prst="rect">
+            <a:avLst/>
+          </a:prstGeom>
+          <a:noFill/>
+          <a:ln>
+            <a:noFill/>
+          </a:ln>
+        </p:spPr>
+        <p:txBody>
+          <a:bodyPr anchorCtr="0" anchor="ctr" bIns="0" lIns="0" spcFirstLastPara="1" rIns="0" wrap="square" tIns="0">
+            <a:noAutofit/>
+          </a:bodyPr>
+          <a:lstStyle/>
+          <a:p>
+            <a:pPr indent="0" lvl="0" marL="0" rtl="0" algn="r">
+              <a:spcBef>
+                <a:spcPts val="0"/>
+              </a:spcBef>
+              <a:spcAft>
+                <a:spcPts val="0"/>
+              </a:spcAft>
+              <a:buNone/>
+            </a:pPr>
+            <a:fld id="{00000000-1234-1234-1234-123412341234}" type="slidenum">
+              <a:rPr lang="fr"/>
+              <a:t>‹#›</a:t>
+            </a:fld>
+            <a:endParaRPr/>
+          </a:p>
+        </p:txBody>
+      </p:sp>
+      <p:pic>
+        <p:nvPicPr>
+          <p:cNvPr id="157" name="Google Shape;157;p25"/>
           <p:cNvPicPr preferRelativeResize="0"/>
           <p:nvPr/>
         </p:nvPicPr>
@@ -16133,7 +16580,7 @@
       </p:pic>
       <p:pic>
         <p:nvPicPr>
-          <p:cNvPr id="145" name="Google Shape;145;p24"/>
+          <p:cNvPr id="158" name="Google Shape;158;p25"/>
           <p:cNvPicPr preferRelativeResize="0"/>
           <p:nvPr/>
         </p:nvPicPr>
@@ -16167,7 +16614,7 @@
       </p:pic>
       <p:pic>
         <p:nvPicPr>
-          <p:cNvPr id="146" name="Google Shape;146;p24"/>
+          <p:cNvPr id="159" name="Google Shape;159;p25"/>
           <p:cNvPicPr preferRelativeResize="0"/>
           <p:nvPr/>
         </p:nvPicPr>
@@ -16201,7 +16648,7 @@
       </p:pic>
       <p:sp>
         <p:nvSpPr>
-          <p:cNvPr id="147" name="Google Shape;147;p24"/>
+          <p:cNvPr id="160" name="Google Shape;160;p25"/>
           <p:cNvSpPr txBox="1"/>
           <p:nvPr/>
         </p:nvSpPr>
@@ -16243,7 +16690,7 @@
       </p:sp>
       <p:sp>
         <p:nvSpPr>
-          <p:cNvPr id="148" name="Google Shape;148;p24"/>
+          <p:cNvPr id="161" name="Google Shape;161;p25"/>
           <p:cNvSpPr txBox="1"/>
           <p:nvPr/>
         </p:nvSpPr>
@@ -16285,7 +16732,7 @@
       </p:sp>
       <p:sp>
         <p:nvSpPr>
-          <p:cNvPr id="149" name="Google Shape;149;p24"/>
+          <p:cNvPr id="162" name="Google Shape;162;p25"/>
           <p:cNvSpPr txBox="1"/>
           <p:nvPr/>
         </p:nvSpPr>
@@ -16333,12 +16780,12 @@
 </p:sld>
 </file>
 
-<file path=ppt/slides/slide3.xml><?xml version="1.0" encoding="utf-8"?>
+<file path=ppt/slides/slide4.xml><?xml version="1.0" encoding="utf-8"?>
 <p:sld xmlns:a="http://schemas.openxmlformats.org/drawingml/2006/main" xmlns:r="http://schemas.openxmlformats.org/officeDocument/2006/relationships" xmlns:mc="http://schemas.openxmlformats.org/markup-compatibility/2006" xmlns:mv="urn:schemas-microsoft-com:mac:vml" xmlns:p="http://schemas.openxmlformats.org/presentationml/2006/main" xmlns:c="http://schemas.openxmlformats.org/drawingml/2006/chart" xmlns:dgm="http://schemas.openxmlformats.org/drawingml/2006/diagram" xmlns:o="urn:schemas-microsoft-com:office:office" xmlns:v="urn:schemas-microsoft-com:vml" xmlns:pvml="urn:schemas-microsoft-com:office:powerpoint" xmlns:com="http://schemas.openxmlformats.org/drawingml/2006/compatibility" xmlns:p14="http://schemas.microsoft.com/office/powerpoint/2010/main" xmlns:p15="http://schemas.microsoft.com/office/powerpoint/2012/main" xmlns:ahyp="http://schemas.microsoft.com/office/drawing/2018/hyperlinkcolor">
   <p:cSld>
     <p:spTree>
       <p:nvGrpSpPr>
-        <p:cNvPr id="153" name="Shape 153"/>
+        <p:cNvPr id="166" name="Shape 166"/>
         <p:cNvGrpSpPr/>
         <p:nvPr/>
       </p:nvGrpSpPr>
@@ -16352,7 +16799,7 @@
       </p:grpSpPr>
       <p:sp>
         <p:nvSpPr>
-          <p:cNvPr id="154" name="Google Shape;154;p25"/>
+          <p:cNvPr id="167" name="Google Shape;167;p26"/>
           <p:cNvSpPr txBox="1"/>
           <p:nvPr>
             <p:ph type="title"/>
@@ -16405,7 +16852,7 @@
       </p:sp>
       <p:sp>
         <p:nvSpPr>
-          <p:cNvPr id="155" name="Google Shape;155;p25"/>
+          <p:cNvPr id="168" name="Google Shape;168;p26"/>
           <p:cNvSpPr txBox="1"/>
           <p:nvPr>
             <p:ph idx="12" type="sldNum"/>
@@ -16449,7 +16896,7 @@
       </p:sp>
       <p:pic>
         <p:nvPicPr>
-          <p:cNvPr id="156" name="Google Shape;156;p25"/>
+          <p:cNvPr id="169" name="Google Shape;169;p26"/>
           <p:cNvPicPr preferRelativeResize="0"/>
           <p:nvPr/>
         </p:nvPicPr>
@@ -16483,7 +16930,7 @@
       </p:pic>
       <p:pic>
         <p:nvPicPr>
-          <p:cNvPr id="157" name="Google Shape;157;p25"/>
+          <p:cNvPr id="170" name="Google Shape;170;p26"/>
           <p:cNvPicPr preferRelativeResize="0"/>
           <p:nvPr/>
         </p:nvPicPr>
@@ -16517,7 +16964,7 @@
       </p:pic>
       <p:pic>
         <p:nvPicPr>
-          <p:cNvPr id="158" name="Google Shape;158;p25"/>
+          <p:cNvPr id="171" name="Google Shape;171;p26"/>
           <p:cNvPicPr preferRelativeResize="0"/>
           <p:nvPr/>
         </p:nvPicPr>
@@ -16551,7 +16998,7 @@
       </p:pic>
       <p:pic>
         <p:nvPicPr>
-          <p:cNvPr id="159" name="Google Shape;159;p25"/>
+          <p:cNvPr id="172" name="Google Shape;172;p26"/>
           <p:cNvPicPr preferRelativeResize="0"/>
           <p:nvPr/>
         </p:nvPicPr>
@@ -16591,12 +17038,12 @@
 </p:sld>
 </file>
 
-<file path=ppt/slides/slide4.xml><?xml version="1.0" encoding="utf-8"?>
+<file path=ppt/slides/slide5.xml><?xml version="1.0" encoding="utf-8"?>
 <p:sld xmlns:a="http://schemas.openxmlformats.org/drawingml/2006/main" xmlns:r="http://schemas.openxmlformats.org/officeDocument/2006/relationships" xmlns:mc="http://schemas.openxmlformats.org/markup-compatibility/2006" xmlns:mv="urn:schemas-microsoft-com:mac:vml" xmlns:p="http://schemas.openxmlformats.org/presentationml/2006/main" xmlns:c="http://schemas.openxmlformats.org/drawingml/2006/chart" xmlns:dgm="http://schemas.openxmlformats.org/drawingml/2006/diagram" xmlns:o="urn:schemas-microsoft-com:office:office" xmlns:v="urn:schemas-microsoft-com:vml" xmlns:pvml="urn:schemas-microsoft-com:office:powerpoint" xmlns:com="http://schemas.openxmlformats.org/drawingml/2006/compatibility" xmlns:p14="http://schemas.microsoft.com/office/powerpoint/2010/main" xmlns:p15="http://schemas.microsoft.com/office/powerpoint/2012/main" xmlns:ahyp="http://schemas.microsoft.com/office/drawing/2018/hyperlinkcolor">
   <p:cSld>
     <p:spTree>
       <p:nvGrpSpPr>
-        <p:cNvPr id="163" name="Shape 163"/>
+        <p:cNvPr id="176" name="Shape 176"/>
         <p:cNvGrpSpPr/>
         <p:nvPr/>
       </p:nvGrpSpPr>
@@ -16610,7 +17057,7 @@
       </p:grpSpPr>
       <p:sp>
         <p:nvSpPr>
-          <p:cNvPr id="164" name="Google Shape;164;p26"/>
+          <p:cNvPr id="177" name="Google Shape;177;p27"/>
           <p:cNvSpPr txBox="1"/>
           <p:nvPr>
             <p:ph type="title"/>
@@ -16662,7 +17109,7 @@
       </p:sp>
       <p:sp>
         <p:nvSpPr>
-          <p:cNvPr id="165" name="Google Shape;165;p26"/>
+          <p:cNvPr id="178" name="Google Shape;178;p27"/>
           <p:cNvSpPr txBox="1"/>
           <p:nvPr>
             <p:ph idx="12" type="sldNum"/>
@@ -16706,7 +17153,7 @@
       </p:sp>
       <p:sp>
         <p:nvSpPr>
-          <p:cNvPr id="166" name="Google Shape;166;p26"/>
+          <p:cNvPr id="179" name="Google Shape;179;p27"/>
           <p:cNvSpPr txBox="1"/>
           <p:nvPr>
             <p:ph idx="2" type="body"/>
@@ -16915,6 +17362,34 @@
           </a:p>
         </p:txBody>
       </p:sp>
+      <p:pic>
+        <p:nvPicPr>
+          <p:cNvPr id="180" name="Google Shape;180;p27"/>
+          <p:cNvPicPr preferRelativeResize="0"/>
+          <p:nvPr/>
+        </p:nvPicPr>
+        <p:blipFill>
+          <a:blip r:embed="rId3">
+            <a:alphaModFix/>
+          </a:blip>
+          <a:stretch>
+            <a:fillRect/>
+          </a:stretch>
+        </p:blipFill>
+        <p:spPr>
+          <a:xfrm>
+            <a:off x="2855050" y="2234600"/>
+            <a:ext cx="6000126" cy="2350051"/>
+          </a:xfrm>
+          <a:prstGeom prst="rect">
+            <a:avLst/>
+          </a:prstGeom>
+          <a:noFill/>
+          <a:ln>
+            <a:noFill/>
+          </a:ln>
+        </p:spPr>
+      </p:pic>
     </p:spTree>
   </p:cSld>
   <p:clrMapOvr>
@@ -16923,12 +17398,12 @@
 </p:sld>
 </file>
 
-<file path=ppt/slides/slide5.xml><?xml version="1.0" encoding="utf-8"?>
+<file path=ppt/slides/slide6.xml><?xml version="1.0" encoding="utf-8"?>
 <p:sld xmlns:a="http://schemas.openxmlformats.org/drawingml/2006/main" xmlns:r="http://schemas.openxmlformats.org/officeDocument/2006/relationships" xmlns:mc="http://schemas.openxmlformats.org/markup-compatibility/2006" xmlns:mv="urn:schemas-microsoft-com:mac:vml" xmlns:p="http://schemas.openxmlformats.org/presentationml/2006/main" xmlns:c="http://schemas.openxmlformats.org/drawingml/2006/chart" xmlns:dgm="http://schemas.openxmlformats.org/drawingml/2006/diagram" xmlns:o="urn:schemas-microsoft-com:office:office" xmlns:v="urn:schemas-microsoft-com:vml" xmlns:pvml="urn:schemas-microsoft-com:office:powerpoint" xmlns:com="http://schemas.openxmlformats.org/drawingml/2006/compatibility" xmlns:p14="http://schemas.microsoft.com/office/powerpoint/2010/main" xmlns:p15="http://schemas.microsoft.com/office/powerpoint/2012/main" xmlns:ahyp="http://schemas.microsoft.com/office/drawing/2018/hyperlinkcolor">
   <p:cSld>
     <p:spTree>
       <p:nvGrpSpPr>
-        <p:cNvPr id="170" name="Shape 170"/>
+        <p:cNvPr id="184" name="Shape 184"/>
         <p:cNvGrpSpPr/>
         <p:nvPr/>
       </p:nvGrpSpPr>
@@ -16942,7 +17417,7 @@
       </p:grpSpPr>
       <p:sp>
         <p:nvSpPr>
-          <p:cNvPr id="171" name="Google Shape;171;p27"/>
+          <p:cNvPr id="185" name="Google Shape;185;p28"/>
           <p:cNvSpPr txBox="1"/>
           <p:nvPr>
             <p:ph type="title"/>
@@ -16994,7 +17469,7 @@
       </p:sp>
       <p:sp>
         <p:nvSpPr>
-          <p:cNvPr id="172" name="Google Shape;172;p27"/>
+          <p:cNvPr id="186" name="Google Shape;186;p28"/>
           <p:cNvSpPr txBox="1"/>
           <p:nvPr>
             <p:ph idx="12" type="sldNum"/>
@@ -17038,7 +17513,7 @@
       </p:sp>
       <p:sp>
         <p:nvSpPr>
-          <p:cNvPr id="173" name="Google Shape;173;p27"/>
+          <p:cNvPr id="187" name="Google Shape;187;p28"/>
           <p:cNvSpPr txBox="1"/>
           <p:nvPr>
             <p:ph idx="2" type="body"/>
@@ -17189,12 +17664,12 @@
 </p:sld>
 </file>
 
-<file path=ppt/slides/slide6.xml><?xml version="1.0" encoding="utf-8"?>
+<file path=ppt/slides/slide7.xml><?xml version="1.0" encoding="utf-8"?>
 <p:sld xmlns:a="http://schemas.openxmlformats.org/drawingml/2006/main" xmlns:r="http://schemas.openxmlformats.org/officeDocument/2006/relationships" xmlns:mc="http://schemas.openxmlformats.org/markup-compatibility/2006" xmlns:mv="urn:schemas-microsoft-com:mac:vml" xmlns:p="http://schemas.openxmlformats.org/presentationml/2006/main" xmlns:c="http://schemas.openxmlformats.org/drawingml/2006/chart" xmlns:dgm="http://schemas.openxmlformats.org/drawingml/2006/diagram" xmlns:o="urn:schemas-microsoft-com:office:office" xmlns:v="urn:schemas-microsoft-com:vml" xmlns:pvml="urn:schemas-microsoft-com:office:powerpoint" xmlns:com="http://schemas.openxmlformats.org/drawingml/2006/compatibility" xmlns:p14="http://schemas.microsoft.com/office/powerpoint/2010/main" xmlns:p15="http://schemas.microsoft.com/office/powerpoint/2012/main" xmlns:ahyp="http://schemas.microsoft.com/office/drawing/2018/hyperlinkcolor">
   <p:cSld>
     <p:spTree>
       <p:nvGrpSpPr>
-        <p:cNvPr id="177" name="Shape 177"/>
+        <p:cNvPr id="191" name="Shape 191"/>
         <p:cNvGrpSpPr/>
         <p:nvPr/>
       </p:nvGrpSpPr>
@@ -17208,7 +17683,7 @@
       </p:grpSpPr>
       <p:sp>
         <p:nvSpPr>
-          <p:cNvPr id="178" name="Google Shape;178;p28"/>
+          <p:cNvPr id="192" name="Google Shape;192;p29"/>
           <p:cNvSpPr txBox="1"/>
           <p:nvPr>
             <p:ph type="title"/>
@@ -17260,7 +17735,7 @@
       </p:sp>
       <p:sp>
         <p:nvSpPr>
-          <p:cNvPr id="179" name="Google Shape;179;p28"/>
+          <p:cNvPr id="193" name="Google Shape;193;p29"/>
           <p:cNvSpPr txBox="1"/>
           <p:nvPr>
             <p:ph idx="12" type="sldNum"/>
@@ -17304,7 +17779,7 @@
       </p:sp>
       <p:pic>
         <p:nvPicPr>
-          <p:cNvPr id="180" name="Google Shape;180;p28"/>
+          <p:cNvPr id="194" name="Google Shape;194;p29"/>
           <p:cNvPicPr preferRelativeResize="0"/>
           <p:nvPr/>
         </p:nvPicPr>
@@ -17332,7 +17807,7 @@
       </p:pic>
       <p:pic>
         <p:nvPicPr>
-          <p:cNvPr id="181" name="Google Shape;181;p28"/>
+          <p:cNvPr id="195" name="Google Shape;195;p29"/>
           <p:cNvPicPr preferRelativeResize="0"/>
           <p:nvPr/>
         </p:nvPicPr>
@@ -17360,7 +17835,7 @@
       </p:pic>
       <p:pic>
         <p:nvPicPr>
-          <p:cNvPr id="182" name="Google Shape;182;p28"/>
+          <p:cNvPr id="196" name="Google Shape;196;p29"/>
           <p:cNvPicPr preferRelativeResize="0"/>
           <p:nvPr/>
         </p:nvPicPr>
@@ -17388,7 +17863,7 @@
       </p:pic>
       <p:pic>
         <p:nvPicPr>
-          <p:cNvPr id="183" name="Google Shape;183;p28"/>
+          <p:cNvPr id="197" name="Google Shape;197;p29"/>
           <p:cNvPicPr preferRelativeResize="0"/>
           <p:nvPr/>
         </p:nvPicPr>
@@ -17415,7 +17890,7 @@
       </p:pic>
       <p:pic>
         <p:nvPicPr>
-          <p:cNvPr id="184" name="Google Shape;184;p28"/>
+          <p:cNvPr id="198" name="Google Shape;198;p29"/>
           <p:cNvPicPr preferRelativeResize="0"/>
           <p:nvPr/>
         </p:nvPicPr>
@@ -17443,10 +17918,10 @@
       </p:pic>
       <p:cxnSp>
         <p:nvCxnSpPr>
-          <p:cNvPr id="185" name="Google Shape;185;p28"/>
+          <p:cNvPr id="199" name="Google Shape;199;p29"/>
           <p:cNvCxnSpPr>
-            <a:stCxn id="180" idx="0"/>
-            <a:endCxn id="182" idx="0"/>
+            <a:stCxn id="194" idx="0"/>
+            <a:endCxn id="196" idx="0"/>
           </p:cNvCxnSpPr>
           <p:nvPr/>
         </p:nvCxnSpPr>
@@ -17474,9 +17949,9 @@
       </p:cxnSp>
       <p:cxnSp>
         <p:nvCxnSpPr>
-          <p:cNvPr id="186" name="Google Shape;186;p28"/>
+          <p:cNvPr id="200" name="Google Shape;200;p29"/>
           <p:cNvCxnSpPr>
-            <a:stCxn id="182" idx="2"/>
+            <a:stCxn id="196" idx="2"/>
           </p:cNvCxnSpPr>
           <p:nvPr/>
         </p:nvCxnSpPr>
@@ -17505,7 +17980,7 @@
       </p:cxnSp>
       <p:cxnSp>
         <p:nvCxnSpPr>
-          <p:cNvPr id="187" name="Google Shape;187;p28"/>
+          <p:cNvPr id="201" name="Google Shape;201;p29"/>
           <p:cNvCxnSpPr/>
           <p:nvPr/>
         </p:nvCxnSpPr>
@@ -17533,9 +18008,9 @@
       </p:cxnSp>
       <p:cxnSp>
         <p:nvCxnSpPr>
-          <p:cNvPr id="188" name="Google Shape;188;p28"/>
+          <p:cNvPr id="202" name="Google Shape;202;p29"/>
           <p:cNvCxnSpPr>
-            <a:endCxn id="183" idx="2"/>
+            <a:endCxn id="197" idx="2"/>
           </p:cNvCxnSpPr>
           <p:nvPr/>
         </p:nvCxnSpPr>
@@ -17564,9 +18039,9 @@
       </p:cxnSp>
       <p:cxnSp>
         <p:nvCxnSpPr>
-          <p:cNvPr id="189" name="Google Shape;189;p28"/>
+          <p:cNvPr id="203" name="Google Shape;203;p29"/>
           <p:cNvCxnSpPr>
-            <a:stCxn id="183" idx="0"/>
+            <a:stCxn id="197" idx="0"/>
           </p:cNvCxnSpPr>
           <p:nvPr/>
         </p:nvCxnSpPr>
@@ -17595,7 +18070,7 @@
       </p:cxnSp>
       <p:cxnSp>
         <p:nvCxnSpPr>
-          <p:cNvPr id="190" name="Google Shape;190;p28"/>
+          <p:cNvPr id="204" name="Google Shape;204;p29"/>
           <p:cNvCxnSpPr/>
           <p:nvPr/>
         </p:nvCxnSpPr>
@@ -17623,7 +18098,7 @@
       </p:cxnSp>
       <p:cxnSp>
         <p:nvCxnSpPr>
-          <p:cNvPr id="191" name="Google Shape;191;p28"/>
+          <p:cNvPr id="205" name="Google Shape;205;p29"/>
           <p:cNvCxnSpPr/>
           <p:nvPr/>
         </p:nvCxnSpPr>
@@ -17651,7 +18126,7 @@
       </p:cxnSp>
       <p:sp>
         <p:nvSpPr>
-          <p:cNvPr id="192" name="Google Shape;192;p28"/>
+          <p:cNvPr id="206" name="Google Shape;206;p29"/>
           <p:cNvSpPr txBox="1"/>
           <p:nvPr/>
         </p:nvSpPr>
@@ -17693,13 +18168,13 @@
       </p:sp>
       <p:sp>
         <p:nvSpPr>
-          <p:cNvPr id="193" name="Google Shape;193;p28"/>
+          <p:cNvPr id="207" name="Google Shape;207;p29"/>
           <p:cNvSpPr txBox="1"/>
           <p:nvPr/>
         </p:nvSpPr>
         <p:spPr>
           <a:xfrm>
-            <a:off x="1593400" y="1488700"/>
+            <a:off x="1673300" y="1577225"/>
             <a:ext cx="1703400" cy="400200"/>
           </a:xfrm>
           <a:prstGeom prst="rect">
@@ -17735,7 +18210,7 @@
       </p:sp>
       <p:sp>
         <p:nvSpPr>
-          <p:cNvPr id="194" name="Google Shape;194;p28"/>
+          <p:cNvPr id="208" name="Google Shape;208;p29"/>
           <p:cNvSpPr txBox="1"/>
           <p:nvPr/>
         </p:nvSpPr>
@@ -17777,7 +18252,7 @@
       </p:sp>
       <p:sp>
         <p:nvSpPr>
-          <p:cNvPr id="195" name="Google Shape;195;p28"/>
+          <p:cNvPr id="209" name="Google Shape;209;p29"/>
           <p:cNvSpPr txBox="1"/>
           <p:nvPr/>
         </p:nvSpPr>
@@ -17819,14 +18294,14 @@
       </p:sp>
       <p:sp>
         <p:nvSpPr>
-          <p:cNvPr id="196" name="Google Shape;196;p28"/>
+          <p:cNvPr id="210" name="Google Shape;210;p29"/>
           <p:cNvSpPr txBox="1"/>
           <p:nvPr/>
         </p:nvSpPr>
         <p:spPr>
-          <a:xfrm rot="-663342">
-            <a:off x="4504226" y="1861762"/>
-            <a:ext cx="1896089" cy="400139"/>
+          <a:xfrm rot="-1349569">
+            <a:off x="4419273" y="2028380"/>
+            <a:ext cx="1758904" cy="400131"/>
           </a:xfrm>
           <a:prstGeom prst="rect">
             <a:avLst/>
@@ -17869,7 +18344,7 @@
       </p:sp>
       <p:sp>
         <p:nvSpPr>
-          <p:cNvPr id="197" name="Google Shape;197;p28"/>
+          <p:cNvPr id="211" name="Google Shape;211;p29"/>
           <p:cNvSpPr txBox="1"/>
           <p:nvPr/>
         </p:nvSpPr>
@@ -17915,7 +18390,7 @@
       </p:sp>
       <p:sp>
         <p:nvSpPr>
-          <p:cNvPr id="198" name="Google Shape;198;p28"/>
+          <p:cNvPr id="212" name="Google Shape;212;p29"/>
           <p:cNvSpPr txBox="1"/>
           <p:nvPr/>
         </p:nvSpPr>
@@ -17983,6 +18458,79 @@
           </a:p>
         </p:txBody>
       </p:sp>
+      <p:cxnSp>
+        <p:nvCxnSpPr>
+          <p:cNvPr id="213" name="Google Shape;213;p29"/>
+          <p:cNvCxnSpPr>
+            <a:stCxn id="197" idx="0"/>
+            <a:endCxn id="194" idx="0"/>
+          </p:cNvCxnSpPr>
+          <p:nvPr/>
+        </p:nvCxnSpPr>
+        <p:spPr>
+          <a:xfrm flipH="1" rot="5400000">
+            <a:off x="3650411" y="-409950"/>
+            <a:ext cx="298800" cy="5425500"/>
+          </a:xfrm>
+          <a:prstGeom prst="curvedConnector3">
+            <a:avLst>
+              <a:gd fmla="val 545557" name="adj1"/>
+            </a:avLst>
+          </a:prstGeom>
+          <a:noFill/>
+          <a:ln cap="flat" cmpd="sng" w="38100">
+            <a:solidFill>
+              <a:schemeClr val="accent5"/>
+            </a:solidFill>
+            <a:prstDash val="dash"/>
+            <a:round/>
+            <a:headEnd len="med" w="med" type="triangle"/>
+            <a:tailEnd len="med" w="med" type="none"/>
+          </a:ln>
+        </p:spPr>
+      </p:cxnSp>
+      <p:sp>
+        <p:nvSpPr>
+          <p:cNvPr id="214" name="Google Shape;214;p29"/>
+          <p:cNvSpPr txBox="1"/>
+          <p:nvPr/>
+        </p:nvSpPr>
+        <p:spPr>
+          <a:xfrm>
+            <a:off x="3149850" y="758875"/>
+            <a:ext cx="1127100" cy="400200"/>
+          </a:xfrm>
+          <a:prstGeom prst="rect">
+            <a:avLst/>
+          </a:prstGeom>
+          <a:noFill/>
+          <a:ln>
+            <a:noFill/>
+          </a:ln>
+        </p:spPr>
+        <p:txBody>
+          <a:bodyPr anchorCtr="0" anchor="t" bIns="91425" lIns="91425" spcFirstLastPara="1" rIns="91425" wrap="square" tIns="91425">
+            <a:spAutoFit/>
+          </a:bodyPr>
+          <a:lstStyle/>
+          <a:p>
+            <a:pPr indent="0" lvl="0" marL="0" rtl="0" algn="l">
+              <a:spcBef>
+                <a:spcPts val="0"/>
+              </a:spcBef>
+              <a:spcAft>
+                <a:spcPts val="0"/>
+              </a:spcAft>
+              <a:buNone/>
+            </a:pPr>
+            <a:r>
+              <a:rPr lang="fr"/>
+              <a:t>formulaires</a:t>
+            </a:r>
+            <a:endParaRPr/>
+          </a:p>
+        </p:txBody>
+      </p:sp>
     </p:spTree>
   </p:cSld>
   <p:clrMapOvr>
@@ -17991,12 +18539,12 @@
 </p:sld>
 </file>
 
-<file path=ppt/slides/slide7.xml><?xml version="1.0" encoding="utf-8"?>
+<file path=ppt/slides/slide8.xml><?xml version="1.0" encoding="utf-8"?>
 <p:sld xmlns:a="http://schemas.openxmlformats.org/drawingml/2006/main" xmlns:r="http://schemas.openxmlformats.org/officeDocument/2006/relationships" xmlns:mc="http://schemas.openxmlformats.org/markup-compatibility/2006" xmlns:mv="urn:schemas-microsoft-com:mac:vml" xmlns:p="http://schemas.openxmlformats.org/presentationml/2006/main" xmlns:c="http://schemas.openxmlformats.org/drawingml/2006/chart" xmlns:dgm="http://schemas.openxmlformats.org/drawingml/2006/diagram" xmlns:o="urn:schemas-microsoft-com:office:office" xmlns:v="urn:schemas-microsoft-com:vml" xmlns:pvml="urn:schemas-microsoft-com:office:powerpoint" xmlns:com="http://schemas.openxmlformats.org/drawingml/2006/compatibility" xmlns:p14="http://schemas.microsoft.com/office/powerpoint/2010/main" xmlns:p15="http://schemas.microsoft.com/office/powerpoint/2012/main" xmlns:ahyp="http://schemas.microsoft.com/office/drawing/2018/hyperlinkcolor">
   <p:cSld>
     <p:spTree>
       <p:nvGrpSpPr>
-        <p:cNvPr id="202" name="Shape 202"/>
+        <p:cNvPr id="218" name="Shape 218"/>
         <p:cNvGrpSpPr/>
         <p:nvPr/>
       </p:nvGrpSpPr>
@@ -18010,7 +18558,7 @@
       </p:grpSpPr>
       <p:sp>
         <p:nvSpPr>
-          <p:cNvPr id="203" name="Google Shape;203;p29"/>
+          <p:cNvPr id="219" name="Google Shape;219;p30"/>
           <p:cNvSpPr txBox="1"/>
           <p:nvPr>
             <p:ph idx="1" type="body"/>
@@ -18072,12 +18620,12 @@
 </p:sld>
 </file>
 
-<file path=ppt/slides/slide8.xml><?xml version="1.0" encoding="utf-8"?>
+<file path=ppt/slides/slide9.xml><?xml version="1.0" encoding="utf-8"?>
 <p:sld xmlns:a="http://schemas.openxmlformats.org/drawingml/2006/main" xmlns:r="http://schemas.openxmlformats.org/officeDocument/2006/relationships" xmlns:mc="http://schemas.openxmlformats.org/markup-compatibility/2006" xmlns:mv="urn:schemas-microsoft-com:mac:vml" xmlns:p="http://schemas.openxmlformats.org/presentationml/2006/main" xmlns:c="http://schemas.openxmlformats.org/drawingml/2006/chart" xmlns:dgm="http://schemas.openxmlformats.org/drawingml/2006/diagram" xmlns:o="urn:schemas-microsoft-com:office:office" xmlns:v="urn:schemas-microsoft-com:vml" xmlns:pvml="urn:schemas-microsoft-com:office:powerpoint" xmlns:com="http://schemas.openxmlformats.org/drawingml/2006/compatibility" xmlns:p14="http://schemas.microsoft.com/office/powerpoint/2010/main" xmlns:p15="http://schemas.microsoft.com/office/powerpoint/2012/main" xmlns:ahyp="http://schemas.microsoft.com/office/drawing/2018/hyperlinkcolor">
   <p:cSld>
     <p:spTree>
       <p:nvGrpSpPr>
-        <p:cNvPr id="207" name="Shape 207"/>
+        <p:cNvPr id="223" name="Shape 223"/>
         <p:cNvGrpSpPr/>
         <p:nvPr/>
       </p:nvGrpSpPr>
@@ -18091,7 +18639,7 @@
       </p:grpSpPr>
       <p:sp>
         <p:nvSpPr>
-          <p:cNvPr id="208" name="Google Shape;208;p30"/>
+          <p:cNvPr id="224" name="Google Shape;224;p31"/>
           <p:cNvSpPr txBox="1"/>
           <p:nvPr>
             <p:ph idx="1" type="body"/>
@@ -18146,9 +18694,9 @@
 </file>
 
 <file path=ppt/theme/theme1.xml><?xml version="1.0" encoding="utf-8"?>
-<a:theme xmlns:a="http://schemas.openxmlformats.org/drawingml/2006/main" xmlns:r="http://schemas.openxmlformats.org/officeDocument/2006/relationships">
+<a:theme xmlns:a="http://schemas.openxmlformats.org/drawingml/2006/main" xmlns:r="http://schemas.openxmlformats.org/officeDocument/2006/relationships" name="Simple Light">
   <a:themeElements>
-    <a:clrScheme name="Default">
+    <a:clrScheme name="Simple Light">
       <a:dk1>
         <a:srgbClr val="000000"/>
       </a:dk1>
@@ -18156,34 +18704,34 @@
         <a:srgbClr val="FFFFFF"/>
       </a:lt1>
       <a:dk2>
-        <a:srgbClr val="158158"/>
+        <a:srgbClr val="595959"/>
       </a:dk2>
       <a:lt2>
-        <a:srgbClr val="F3F3F3"/>
+        <a:srgbClr val="EEEEEE"/>
       </a:lt2>
       <a:accent1>
-        <a:srgbClr val="058DC7"/>
+        <a:srgbClr val="4285F4"/>
       </a:accent1>
       <a:accent2>
-        <a:srgbClr val="50B432"/>
+        <a:srgbClr val="212121"/>
       </a:accent2>
       <a:accent3>
-        <a:srgbClr val="ED561B"/>
+        <a:srgbClr val="78909C"/>
       </a:accent3>
       <a:accent4>
-        <a:srgbClr val="EDEF00"/>
+        <a:srgbClr val="FFAB40"/>
       </a:accent4>
       <a:accent5>
-        <a:srgbClr val="24CBE5"/>
+        <a:srgbClr val="0097A7"/>
       </a:accent5>
       <a:accent6>
-        <a:srgbClr val="64E572"/>
+        <a:srgbClr val="EEFF41"/>
       </a:accent6>
       <a:hlink>
-        <a:srgbClr val="2200CC"/>
+        <a:srgbClr val="0097A7"/>
       </a:hlink>
       <a:folHlink>
-        <a:srgbClr val="551A8B"/>
+        <a:srgbClr val="0097A7"/>
       </a:folHlink>
     </a:clrScheme>
     <a:fontScheme name="Office">
@@ -18704,9 +19252,9 @@
 </file>
 
 <file path=ppt/theme/theme3.xml><?xml version="1.0" encoding="utf-8"?>
-<a:theme xmlns:a="http://schemas.openxmlformats.org/drawingml/2006/main" xmlns:r="http://schemas.openxmlformats.org/officeDocument/2006/relationships" name="Simple Light">
+<a:theme xmlns:a="http://schemas.openxmlformats.org/drawingml/2006/main" xmlns:r="http://schemas.openxmlformats.org/officeDocument/2006/relationships">
   <a:themeElements>
-    <a:clrScheme name="Simple Light">
+    <a:clrScheme name="Default">
       <a:dk1>
         <a:srgbClr val="000000"/>
       </a:dk1>
@@ -18714,34 +19262,34 @@
         <a:srgbClr val="FFFFFF"/>
       </a:lt1>
       <a:dk2>
-        <a:srgbClr val="595959"/>
+        <a:srgbClr val="158158"/>
       </a:dk2>
       <a:lt2>
-        <a:srgbClr val="EEEEEE"/>
+        <a:srgbClr val="F3F3F3"/>
       </a:lt2>
       <a:accent1>
-        <a:srgbClr val="4285F4"/>
+        <a:srgbClr val="058DC7"/>
       </a:accent1>
       <a:accent2>
-        <a:srgbClr val="212121"/>
+        <a:srgbClr val="50B432"/>
       </a:accent2>
       <a:accent3>
-        <a:srgbClr val="78909C"/>
+        <a:srgbClr val="ED561B"/>
       </a:accent3>
       <a:accent4>
-        <a:srgbClr val="FFAB40"/>
+        <a:srgbClr val="EDEF00"/>
       </a:accent4>
       <a:accent5>
-        <a:srgbClr val="0097A7"/>
+        <a:srgbClr val="24CBE5"/>
       </a:accent5>
       <a:accent6>
-        <a:srgbClr val="EEFF41"/>
+        <a:srgbClr val="64E572"/>
       </a:accent6>
       <a:hlink>
-        <a:srgbClr val="0097A7"/>
+        <a:srgbClr val="2200CC"/>
       </a:hlink>
       <a:folHlink>
-        <a:srgbClr val="0097A7"/>
+        <a:srgbClr val="551A8B"/>
       </a:folHlink>
     </a:clrScheme>
     <a:fontScheme name="Office">

</xml_diff>